<commit_message>
crystal structure updated, bibtex works
</commit_message>
<xml_diff>
--- a/plots/crystalstructuredesign.pptx
+++ b/plots/crystalstructuredesign.pptx
@@ -104,6 +104,11 @@
       </a:defRPr>
     </a:lvl9pPr>
   </p:defaultTextStyle>
+  <p:extLst>
+    <p:ext uri="{EFAFB233-063F-42B5-8137-9DF3F51BA10A}">
+      <p15:sldGuideLst xmlns:p15="http://schemas.microsoft.com/office/powerpoint/2012/main"/>
+    </p:ext>
+  </p:extLst>
 </p:presentation>
 </file>
 
@@ -3110,7 +3115,7 @@
       </p:sp>
       <p:grpSp>
         <p:nvGrpSpPr>
-          <p:cNvPr id="60" name="Group 59"/>
+          <p:cNvPr id="2" name="Group 1"/>
           <p:cNvGrpSpPr/>
           <p:nvPr/>
         </p:nvGrpSpPr>
@@ -3118,7 +3123,7 @@
           <a:xfrm>
             <a:off x="5368343" y="925993"/>
             <a:ext cx="3878687" cy="2657856"/>
-            <a:chOff x="5368343" y="926075"/>
+            <a:chOff x="5368343" y="925993"/>
             <a:chExt cx="3878687" cy="2657856"/>
           </a:xfrm>
         </p:grpSpPr>
@@ -3130,7 +3135,7 @@
           </p:nvGrpSpPr>
           <p:grpSpPr>
             <a:xfrm>
-              <a:off x="5368343" y="926075"/>
+              <a:off x="5368343" y="925993"/>
               <a:ext cx="3878687" cy="2657856"/>
               <a:chOff x="5368343" y="926075"/>
               <a:chExt cx="3878687" cy="2657856"/>
@@ -3575,7 +3580,7 @@
           </p:nvGrpSpPr>
           <p:grpSpPr>
             <a:xfrm>
-              <a:off x="5857738" y="1345495"/>
+              <a:off x="5857738" y="1345413"/>
               <a:ext cx="2914918" cy="1813560"/>
               <a:chOff x="5857738" y="1345495"/>
               <a:chExt cx="2914918" cy="1813560"/>
@@ -3830,7 +3835,7 @@
           </p:nvSpPr>
           <p:spPr>
             <a:xfrm>
-              <a:off x="7315193" y="1764915"/>
+              <a:off x="6887508" y="1495367"/>
               <a:ext cx="965915" cy="969264"/>
             </a:xfrm>
             <a:prstGeom prst="ellipse">
@@ -4663,7 +4668,7 @@
         </p:nvSpPr>
         <p:spPr>
           <a:xfrm>
-            <a:off x="7629113" y="2070255"/>
+            <a:off x="7201428" y="1800789"/>
             <a:ext cx="350957" cy="369332"/>
           </a:xfrm>
           <a:prstGeom prst="rect">
@@ -4723,7 +4728,7 @@
         </p:nvSpPr>
         <p:spPr>
           <a:xfrm>
-            <a:off x="6648174" y="1638439"/>
+            <a:off x="6158779" y="2489675"/>
             <a:ext cx="350957" cy="369332"/>
           </a:xfrm>
           <a:prstGeom prst="rect">
@@ -4741,7 +4746,6 @@
               <a:rPr lang="en-US" dirty="0"/>
               <a:t>B</a:t>
             </a:r>
-            <a:endParaRPr lang="en-US" dirty="0"/>
           </a:p>
         </p:txBody>
       </p:sp>
@@ -4771,7 +4775,6 @@
               <a:rPr lang="en-US" dirty="0"/>
               <a:t>B</a:t>
             </a:r>
-            <a:endParaRPr lang="en-US" dirty="0"/>
           </a:p>
         </p:txBody>
       </p:sp>
@@ -4831,7 +4834,6 @@
               <a:rPr lang="en-US" dirty="0"/>
               <a:t>C</a:t>
             </a:r>
-            <a:endParaRPr lang="en-US" dirty="0"/>
           </a:p>
         </p:txBody>
       </p:sp>

</xml_diff>